<commit_message>
Change skill order and expand description
</commit_message>
<xml_diff>
--- a/images/portofolio images.pptx
+++ b/images/portofolio images.pptx
@@ -9,6 +9,9 @@
     <p:sldId id="258" r:id="rId3"/>
     <p:sldId id="257" r:id="rId4"/>
     <p:sldId id="259" r:id="rId5"/>
+    <p:sldId id="262" r:id="rId6"/>
+    <p:sldId id="261" r:id="rId7"/>
+    <p:sldId id="260" r:id="rId8"/>
   </p:sldIdLst>
   <p:sldSz cx="9144000" cy="6858000" type="screen4x3"/>
   <p:notesSz cx="6858000" cy="9144000"/>
@@ -107,6 +110,11 @@
       </a:defRPr>
     </a:lvl9pPr>
   </p:defaultTextStyle>
+  <p:extLst>
+    <p:ext uri="{EFAFB233-063F-42B5-8137-9DF3F51BA10A}">
+      <p15:sldGuideLst xmlns:p15="http://schemas.microsoft.com/office/powerpoint/2012/main"/>
+    </p:ext>
+  </p:extLst>
 </p:presentation>
 </file>
 
@@ -3577,6 +3585,562 @@
 </p:sld>
 </file>
 
+<file path=ppt/slides/slide5.xml><?xml version="1.0" encoding="utf-8"?>
+<p:sld xmlns:a="http://schemas.openxmlformats.org/drawingml/2006/main" xmlns:r="http://schemas.openxmlformats.org/officeDocument/2006/relationships" xmlns:p="http://schemas.openxmlformats.org/presentationml/2006/main">
+  <p:cSld>
+    <p:spTree>
+      <p:nvGrpSpPr>
+        <p:cNvPr id="1" name=""/>
+        <p:cNvGrpSpPr/>
+        <p:nvPr/>
+      </p:nvGrpSpPr>
+      <p:grpSpPr>
+        <a:xfrm>
+          <a:off x="0" y="0"/>
+          <a:ext cx="0" cy="0"/>
+          <a:chOff x="0" y="0"/>
+          <a:chExt cx="0" cy="0"/>
+        </a:xfrm>
+      </p:grpSpPr>
+      <p:grpSp>
+        <p:nvGrpSpPr>
+          <p:cNvPr id="7" name="Group 6">
+            <a:extLst>
+              <a:ext uri="{FF2B5EF4-FFF2-40B4-BE49-F238E27FC236}">
+                <a16:creationId xmlns:a16="http://schemas.microsoft.com/office/drawing/2014/main" id="{58576064-203D-4C4C-8791-4ECE8DD0B8AF}"/>
+              </a:ext>
+            </a:extLst>
+          </p:cNvPr>
+          <p:cNvGrpSpPr/>
+          <p:nvPr/>
+        </p:nvGrpSpPr>
+        <p:grpSpPr>
+          <a:xfrm>
+            <a:off x="2330506" y="1231226"/>
+            <a:ext cx="4433199" cy="4433199"/>
+            <a:chOff x="2330506" y="1231226"/>
+            <a:chExt cx="4433199" cy="4433199"/>
+          </a:xfrm>
+        </p:grpSpPr>
+        <p:sp>
+          <p:nvSpPr>
+            <p:cNvPr id="6" name="Rectangle 5">
+              <a:extLst>
+                <a:ext uri="{FF2B5EF4-FFF2-40B4-BE49-F238E27FC236}">
+                  <a16:creationId xmlns:a16="http://schemas.microsoft.com/office/drawing/2014/main" id="{039D0F1B-B4AC-3B44-B9ED-09F90E87467E}"/>
+                </a:ext>
+              </a:extLst>
+            </p:cNvPr>
+            <p:cNvSpPr/>
+            <p:nvPr/>
+          </p:nvSpPr>
+          <p:spPr>
+            <a:xfrm>
+              <a:off x="2330506" y="1231226"/>
+              <a:ext cx="4433199" cy="4433199"/>
+            </a:xfrm>
+            <a:prstGeom prst="rect">
+              <a:avLst/>
+            </a:prstGeom>
+            <a:noFill/>
+            <a:ln>
+              <a:noFill/>
+            </a:ln>
+          </p:spPr>
+          <p:style>
+            <a:lnRef idx="1">
+              <a:schemeClr val="accent1"/>
+            </a:lnRef>
+            <a:fillRef idx="3">
+              <a:schemeClr val="accent1"/>
+            </a:fillRef>
+            <a:effectRef idx="2">
+              <a:schemeClr val="accent1"/>
+            </a:effectRef>
+            <a:fontRef idx="minor">
+              <a:schemeClr val="lt1"/>
+            </a:fontRef>
+          </p:style>
+          <p:txBody>
+            <a:bodyPr rtlCol="0" anchor="ctr"/>
+            <a:lstStyle/>
+            <a:p>
+              <a:pPr algn="ctr"/>
+              <a:endParaRPr lang="en-US"/>
+            </a:p>
+          </p:txBody>
+        </p:sp>
+        <p:pic>
+          <p:nvPicPr>
+            <p:cNvPr id="5" name="Picture 4">
+              <a:extLst>
+                <a:ext uri="{FF2B5EF4-FFF2-40B4-BE49-F238E27FC236}">
+                  <a16:creationId xmlns:a16="http://schemas.microsoft.com/office/drawing/2014/main" id="{0BC5E6C2-2F2E-2A4D-B5D3-E967AAA2D937}"/>
+                </a:ext>
+              </a:extLst>
+            </p:cNvPr>
+            <p:cNvPicPr>
+              <a:picLocks noChangeAspect="1"/>
+            </p:cNvPicPr>
+            <p:nvPr/>
+          </p:nvPicPr>
+          <p:blipFill rotWithShape="1">
+            <a:blip r:embed="rId2"/>
+            <a:srcRect b="23367"/>
+            <a:stretch/>
+          </p:blipFill>
+          <p:spPr>
+            <a:xfrm>
+              <a:off x="2534155" y="1919835"/>
+              <a:ext cx="4025900" cy="3055980"/>
+            </a:xfrm>
+            <a:prstGeom prst="rect">
+              <a:avLst/>
+            </a:prstGeom>
+          </p:spPr>
+        </p:pic>
+      </p:grpSp>
+    </p:spTree>
+    <p:extLst>
+      <p:ext uri="{BB962C8B-B14F-4D97-AF65-F5344CB8AC3E}">
+        <p14:creationId xmlns:p14="http://schemas.microsoft.com/office/powerpoint/2010/main" val="430173852"/>
+      </p:ext>
+    </p:extLst>
+  </p:cSld>
+  <p:clrMapOvr>
+    <a:masterClrMapping/>
+  </p:clrMapOvr>
+</p:sld>
+</file>
+
+<file path=ppt/slides/slide6.xml><?xml version="1.0" encoding="utf-8"?>
+<p:sld xmlns:a="http://schemas.openxmlformats.org/drawingml/2006/main" xmlns:r="http://schemas.openxmlformats.org/officeDocument/2006/relationships" xmlns:p="http://schemas.openxmlformats.org/presentationml/2006/main">
+  <p:cSld>
+    <p:spTree>
+      <p:nvGrpSpPr>
+        <p:cNvPr id="1" name=""/>
+        <p:cNvGrpSpPr/>
+        <p:nvPr/>
+      </p:nvGrpSpPr>
+      <p:grpSpPr>
+        <a:xfrm>
+          <a:off x="0" y="0"/>
+          <a:ext cx="0" cy="0"/>
+          <a:chOff x="0" y="0"/>
+          <a:chExt cx="0" cy="0"/>
+        </a:xfrm>
+      </p:grpSpPr>
+      <p:grpSp>
+        <p:nvGrpSpPr>
+          <p:cNvPr id="3" name="Group 2">
+            <a:extLst>
+              <a:ext uri="{FF2B5EF4-FFF2-40B4-BE49-F238E27FC236}">
+                <a16:creationId xmlns:a16="http://schemas.microsoft.com/office/drawing/2014/main" id="{AEE95B90-BE4E-7C4F-82EC-FAF8A44D4517}"/>
+              </a:ext>
+            </a:extLst>
+          </p:cNvPr>
+          <p:cNvGrpSpPr/>
+          <p:nvPr/>
+        </p:nvGrpSpPr>
+        <p:grpSpPr>
+          <a:xfrm>
+            <a:off x="1942088" y="347958"/>
+            <a:ext cx="6036659" cy="6036659"/>
+            <a:chOff x="1942088" y="347958"/>
+            <a:chExt cx="6036659" cy="6036659"/>
+          </a:xfrm>
+        </p:grpSpPr>
+        <p:sp>
+          <p:nvSpPr>
+            <p:cNvPr id="2" name="Oval 1">
+              <a:extLst>
+                <a:ext uri="{FF2B5EF4-FFF2-40B4-BE49-F238E27FC236}">
+                  <a16:creationId xmlns:a16="http://schemas.microsoft.com/office/drawing/2014/main" id="{B3F08FC6-77D2-3D4F-B66B-BBBAE56F44C4}"/>
+                </a:ext>
+              </a:extLst>
+            </p:cNvPr>
+            <p:cNvSpPr/>
+            <p:nvPr/>
+          </p:nvSpPr>
+          <p:spPr>
+            <a:xfrm>
+              <a:off x="2194503" y="585850"/>
+              <a:ext cx="5478308" cy="5478308"/>
+            </a:xfrm>
+            <a:prstGeom prst="ellipse">
+              <a:avLst/>
+            </a:prstGeom>
+            <a:solidFill>
+              <a:srgbClr val="84DBFF"/>
+            </a:solidFill>
+            <a:ln>
+              <a:noFill/>
+            </a:ln>
+          </p:spPr>
+          <p:style>
+            <a:lnRef idx="1">
+              <a:schemeClr val="accent1"/>
+            </a:lnRef>
+            <a:fillRef idx="3">
+              <a:schemeClr val="accent1"/>
+            </a:fillRef>
+            <a:effectRef idx="2">
+              <a:schemeClr val="accent1"/>
+            </a:effectRef>
+            <a:fontRef idx="minor">
+              <a:schemeClr val="lt1"/>
+            </a:fontRef>
+          </p:style>
+          <p:txBody>
+            <a:bodyPr rtlCol="0" anchor="ctr"/>
+            <a:lstStyle/>
+            <a:p>
+              <a:pPr algn="ctr"/>
+              <a:endParaRPr lang="en-US"/>
+            </a:p>
+          </p:txBody>
+        </p:sp>
+        <p:grpSp>
+          <p:nvGrpSpPr>
+            <p:cNvPr id="11" name="Group 10">
+              <a:extLst>
+                <a:ext uri="{FF2B5EF4-FFF2-40B4-BE49-F238E27FC236}">
+                  <a16:creationId xmlns:a16="http://schemas.microsoft.com/office/drawing/2014/main" id="{355D3C39-C05A-9D48-9554-6A61F91E50A1}"/>
+                </a:ext>
+              </a:extLst>
+            </p:cNvPr>
+            <p:cNvGrpSpPr/>
+            <p:nvPr/>
+          </p:nvGrpSpPr>
+          <p:grpSpPr>
+            <a:xfrm>
+              <a:off x="1942088" y="347958"/>
+              <a:ext cx="6036659" cy="6036659"/>
+              <a:chOff x="1942088" y="347958"/>
+              <a:chExt cx="6036659" cy="6036659"/>
+            </a:xfrm>
+          </p:grpSpPr>
+          <p:pic>
+            <p:nvPicPr>
+              <p:cNvPr id="5" name="Picture 4">
+                <a:extLst>
+                  <a:ext uri="{FF2B5EF4-FFF2-40B4-BE49-F238E27FC236}">
+                    <a16:creationId xmlns:a16="http://schemas.microsoft.com/office/drawing/2014/main" id="{F369BBA9-E948-EC4E-9734-F87DEB856AE4}"/>
+                  </a:ext>
+                </a:extLst>
+              </p:cNvPr>
+              <p:cNvPicPr>
+                <a:picLocks noChangeAspect="1"/>
+              </p:cNvPicPr>
+              <p:nvPr/>
+            </p:nvPicPr>
+            <p:blipFill>
+              <a:blip r:embed="rId2"/>
+              <a:stretch>
+                <a:fillRect/>
+              </a:stretch>
+            </p:blipFill>
+            <p:spPr>
+              <a:xfrm rot="20936912">
+                <a:off x="3099474" y="1505344"/>
+                <a:ext cx="3721886" cy="3721886"/>
+              </a:xfrm>
+              <a:prstGeom prst="rect">
+                <a:avLst/>
+              </a:prstGeom>
+            </p:spPr>
+          </p:pic>
+          <p:sp>
+            <p:nvSpPr>
+              <p:cNvPr id="6" name="Donut 5">
+                <a:extLst>
+                  <a:ext uri="{FF2B5EF4-FFF2-40B4-BE49-F238E27FC236}">
+                    <a16:creationId xmlns:a16="http://schemas.microsoft.com/office/drawing/2014/main" id="{C8A1F530-4EC1-254F-A425-DCABA11391F7}"/>
+                  </a:ext>
+                </a:extLst>
+              </p:cNvPr>
+              <p:cNvSpPr/>
+              <p:nvPr/>
+            </p:nvSpPr>
+            <p:spPr>
+              <a:xfrm>
+                <a:off x="1942088" y="347958"/>
+                <a:ext cx="6036659" cy="6036659"/>
+              </a:xfrm>
+              <a:prstGeom prst="donut">
+                <a:avLst>
+                  <a:gd name="adj" fmla="val 9180"/>
+                </a:avLst>
+              </a:prstGeom>
+              <a:solidFill>
+                <a:srgbClr val="58C0EB"/>
+              </a:solidFill>
+              <a:ln>
+                <a:noFill/>
+              </a:ln>
+              <a:effectLst>
+                <a:outerShdw blurRad="40000" dist="50800" dir="5400000" rotWithShape="0">
+                  <a:srgbClr val="000000">
+                    <a:alpha val="35000"/>
+                  </a:srgbClr>
+                </a:outerShdw>
+              </a:effectLst>
+            </p:spPr>
+            <p:style>
+              <a:lnRef idx="1">
+                <a:schemeClr val="accent1"/>
+              </a:lnRef>
+              <a:fillRef idx="3">
+                <a:schemeClr val="accent1"/>
+              </a:fillRef>
+              <a:effectRef idx="2">
+                <a:schemeClr val="accent1"/>
+              </a:effectRef>
+              <a:fontRef idx="minor">
+                <a:schemeClr val="lt1"/>
+              </a:fontRef>
+            </p:style>
+            <p:txBody>
+              <a:bodyPr rtlCol="0" anchor="ctr"/>
+              <a:lstStyle/>
+              <a:p>
+                <a:pPr algn="ctr"/>
+                <a:endParaRPr lang="en-US" dirty="0">
+                  <a:solidFill>
+                    <a:schemeClr val="tx1"/>
+                  </a:solidFill>
+                </a:endParaRPr>
+              </a:p>
+            </p:txBody>
+          </p:sp>
+          <p:sp>
+            <p:nvSpPr>
+              <p:cNvPr id="7" name="Lightning Bolt 6">
+                <a:extLst>
+                  <a:ext uri="{FF2B5EF4-FFF2-40B4-BE49-F238E27FC236}">
+                    <a16:creationId xmlns:a16="http://schemas.microsoft.com/office/drawing/2014/main" id="{7CAC1944-EFB7-C140-9B8B-0BCBC5013C81}"/>
+                  </a:ext>
+                </a:extLst>
+              </p:cNvPr>
+              <p:cNvSpPr/>
+              <p:nvPr/>
+            </p:nvSpPr>
+            <p:spPr>
+              <a:xfrm rot="20748491">
+                <a:off x="4393976" y="2896949"/>
+                <a:ext cx="501706" cy="372233"/>
+              </a:xfrm>
+              <a:prstGeom prst="lightningBolt">
+                <a:avLst/>
+              </a:prstGeom>
+              <a:solidFill>
+                <a:srgbClr val="84DBFF"/>
+              </a:solidFill>
+              <a:ln>
+                <a:noFill/>
+              </a:ln>
+              <a:effectLst/>
+            </p:spPr>
+            <p:style>
+              <a:lnRef idx="1">
+                <a:schemeClr val="accent1"/>
+              </a:lnRef>
+              <a:fillRef idx="3">
+                <a:schemeClr val="accent1"/>
+              </a:fillRef>
+              <a:effectRef idx="2">
+                <a:schemeClr val="accent1"/>
+              </a:effectRef>
+              <a:fontRef idx="minor">
+                <a:schemeClr val="lt1"/>
+              </a:fontRef>
+            </p:style>
+            <p:txBody>
+              <a:bodyPr rtlCol="0" anchor="ctr"/>
+              <a:lstStyle/>
+              <a:p>
+                <a:pPr algn="ctr"/>
+                <a:endParaRPr lang="en-US"/>
+              </a:p>
+            </p:txBody>
+          </p:sp>
+          <p:grpSp>
+            <p:nvGrpSpPr>
+              <p:cNvPr id="10" name="Group 9">
+                <a:extLst>
+                  <a:ext uri="{FF2B5EF4-FFF2-40B4-BE49-F238E27FC236}">
+                    <a16:creationId xmlns:a16="http://schemas.microsoft.com/office/drawing/2014/main" id="{156154A3-FA27-4349-84DF-65A2D6A96403}"/>
+                  </a:ext>
+                </a:extLst>
+              </p:cNvPr>
+              <p:cNvGrpSpPr/>
+              <p:nvPr/>
+            </p:nvGrpSpPr>
+            <p:grpSpPr>
+              <a:xfrm>
+                <a:off x="3417120" y="2396791"/>
+                <a:ext cx="3217497" cy="1938992"/>
+                <a:chOff x="3433304" y="2355508"/>
+                <a:chExt cx="3217497" cy="1938992"/>
+              </a:xfrm>
+            </p:grpSpPr>
+            <p:sp>
+              <p:nvSpPr>
+                <p:cNvPr id="8" name="TextBox 7">
+                  <a:extLst>
+                    <a:ext uri="{FF2B5EF4-FFF2-40B4-BE49-F238E27FC236}">
+                      <a16:creationId xmlns:a16="http://schemas.microsoft.com/office/drawing/2014/main" id="{15C06671-277A-A84C-9531-C7862E1C6AD4}"/>
+                    </a:ext>
+                  </a:extLst>
+                </p:cNvPr>
+                <p:cNvSpPr txBox="1"/>
+                <p:nvPr/>
+              </p:nvSpPr>
+              <p:spPr>
+                <a:xfrm>
+                  <a:off x="3433304" y="2355508"/>
+                  <a:ext cx="909223" cy="1938992"/>
+                </a:xfrm>
+                <a:prstGeom prst="rect">
+                  <a:avLst/>
+                </a:prstGeom>
+                <a:noFill/>
+              </p:spPr>
+              <p:txBody>
+                <a:bodyPr wrap="none" rtlCol="0">
+                  <a:spAutoFit/>
+                </a:bodyPr>
+                <a:lstStyle/>
+                <a:p>
+                  <a:r>
+                    <a:rPr lang="en-US" sz="12000" dirty="0">
+                      <a:solidFill>
+                        <a:schemeClr val="bg1"/>
+                      </a:solidFill>
+                      <a:latin typeface="Aharoni" panose="02010803020104030203" pitchFamily="2" charset="-79"/>
+                      <a:cs typeface="Aharoni" panose="02010803020104030203" pitchFamily="2" charset="-79"/>
+                    </a:rPr>
+                    <a:t>T</a:t>
+                  </a:r>
+                </a:p>
+              </p:txBody>
+            </p:sp>
+            <p:sp>
+              <p:nvSpPr>
+                <p:cNvPr id="9" name="TextBox 8">
+                  <a:extLst>
+                    <a:ext uri="{FF2B5EF4-FFF2-40B4-BE49-F238E27FC236}">
+                      <a16:creationId xmlns:a16="http://schemas.microsoft.com/office/drawing/2014/main" id="{422D13CE-715E-AD48-9973-510C16734308}"/>
+                    </a:ext>
+                  </a:extLst>
+                </p:cNvPr>
+                <p:cNvSpPr txBox="1"/>
+                <p:nvPr/>
+              </p:nvSpPr>
+              <p:spPr>
+                <a:xfrm>
+                  <a:off x="5558835" y="2355508"/>
+                  <a:ext cx="1091966" cy="1938992"/>
+                </a:xfrm>
+                <a:prstGeom prst="rect">
+                  <a:avLst/>
+                </a:prstGeom>
+                <a:noFill/>
+              </p:spPr>
+              <p:txBody>
+                <a:bodyPr wrap="none" rtlCol="0">
+                  <a:spAutoFit/>
+                </a:bodyPr>
+                <a:lstStyle/>
+                <a:p>
+                  <a:r>
+                    <a:rPr lang="en-US" sz="12000" dirty="0">
+                      <a:solidFill>
+                        <a:schemeClr val="bg1"/>
+                      </a:solidFill>
+                      <a:latin typeface="Aharoni" panose="02010803020104030203" pitchFamily="2" charset="-79"/>
+                      <a:cs typeface="Aharoni" panose="02010803020104030203" pitchFamily="2" charset="-79"/>
+                    </a:rPr>
+                    <a:t>C</a:t>
+                  </a:r>
+                </a:p>
+              </p:txBody>
+            </p:sp>
+          </p:grpSp>
+        </p:grpSp>
+      </p:grpSp>
+    </p:spTree>
+    <p:extLst>
+      <p:ext uri="{BB962C8B-B14F-4D97-AF65-F5344CB8AC3E}">
+        <p14:creationId xmlns:p14="http://schemas.microsoft.com/office/powerpoint/2010/main" val="376342334"/>
+      </p:ext>
+    </p:extLst>
+  </p:cSld>
+  <p:clrMapOvr>
+    <a:masterClrMapping/>
+  </p:clrMapOvr>
+</p:sld>
+</file>
+
+<file path=ppt/slides/slide7.xml><?xml version="1.0" encoding="utf-8"?>
+<p:sld xmlns:a="http://schemas.openxmlformats.org/drawingml/2006/main" xmlns:r="http://schemas.openxmlformats.org/officeDocument/2006/relationships" xmlns:p="http://schemas.openxmlformats.org/presentationml/2006/main">
+  <p:cSld>
+    <p:spTree>
+      <p:nvGrpSpPr>
+        <p:cNvPr id="1" name=""/>
+        <p:cNvGrpSpPr/>
+        <p:nvPr/>
+      </p:nvGrpSpPr>
+      <p:grpSpPr>
+        <a:xfrm>
+          <a:off x="0" y="0"/>
+          <a:ext cx="0" cy="0"/>
+          <a:chOff x="0" y="0"/>
+          <a:chExt cx="0" cy="0"/>
+        </a:xfrm>
+      </p:grpSpPr>
+      <p:pic>
+        <p:nvPicPr>
+          <p:cNvPr id="7" name="Picture 6">
+            <a:extLst>
+              <a:ext uri="{FF2B5EF4-FFF2-40B4-BE49-F238E27FC236}">
+                <a16:creationId xmlns:a16="http://schemas.microsoft.com/office/drawing/2014/main" id="{7669FF70-4D84-5B43-88BE-8FD70B4D9D41}"/>
+              </a:ext>
+            </a:extLst>
+          </p:cNvPr>
+          <p:cNvPicPr>
+            <a:picLocks noChangeAspect="1"/>
+          </p:cNvPicPr>
+          <p:nvPr/>
+        </p:nvPicPr>
+        <p:blipFill rotWithShape="1">
+          <a:blip r:embed="rId2"/>
+          <a:srcRect r="11253"/>
+          <a:stretch/>
+        </p:blipFill>
+        <p:spPr>
+          <a:xfrm>
+            <a:off x="-1" y="0"/>
+            <a:ext cx="9144001" cy="6858000"/>
+          </a:xfrm>
+          <a:prstGeom prst="rect">
+            <a:avLst/>
+          </a:prstGeom>
+        </p:spPr>
+      </p:pic>
+    </p:spTree>
+    <p:extLst>
+      <p:ext uri="{BB962C8B-B14F-4D97-AF65-F5344CB8AC3E}">
+        <p14:creationId xmlns:p14="http://schemas.microsoft.com/office/powerpoint/2010/main" val="3496456841"/>
+      </p:ext>
+    </p:extLst>
+  </p:cSld>
+  <p:clrMapOvr>
+    <a:masterClrMapping/>
+  </p:clrMapOvr>
+</p:sld>
+</file>
+
 <file path=ppt/theme/theme1.xml><?xml version="1.0" encoding="utf-8"?>
 <a:theme xmlns:a="http://schemas.openxmlformats.org/drawingml/2006/main" name="Default Theme">
   <a:themeElements>

</xml_diff>